<commit_message>
adjustments for the ER
</commit_message>
<xml_diff>
--- a/Vocabulary/LinearReferencing.pptx
+++ b/Vocabulary/LinearReferencing.pptx
@@ -21920,7 +21920,15 @@
             </a:r>
             <a:r>
               <a:rPr lang="fr-FR" dirty="0" smtClean="0"/>
-              <a:t> the ER</a:t>
+              <a:t> </a:t>
+            </a:r>
+            <a:r>
+              <a:rPr lang="fr-FR" smtClean="0"/>
+              <a:t>the </a:t>
+            </a:r>
+            <a:r>
+              <a:rPr lang="fr-FR" smtClean="0"/>
+              <a:t>ER </a:t>
             </a:r>
             <a:endParaRPr lang="fr-FR" dirty="0" smtClean="0"/>
           </a:p>

</xml_diff>